<commit_message>
Fix QuestionnaireService and inizialized some servlet and html pages
</commit_message>
<xml_diff>
--- a/DD.pptx
+++ b/DD.pptx
@@ -226,7 +226,7 @@
           <a:p>
             <a:fld id="{ED92C02F-46E9-4319-AE92-CFF24FDD2824}" type="datetimeFigureOut">
               <a:rPr lang="en-GB" smtClean="0"/>
-              <a:t>28/01/2021</a:t>
+              <a:t>29/01/2021</a:t>
             </a:fld>
             <a:endParaRPr lang="en-GB" dirty="0"/>
           </a:p>
@@ -1145,7 +1145,7 @@
           <a:p>
             <a:fld id="{4CAA9714-E498-4BB1-946F-9B4AA3A4C648}" type="datetimeFigureOut">
               <a:rPr lang="en-GB" smtClean="0"/>
-              <a:t>28/01/2021</a:t>
+              <a:t>29/01/2021</a:t>
             </a:fld>
             <a:endParaRPr lang="en-GB" dirty="0"/>
           </a:p>
@@ -1315,7 +1315,7 @@
           <a:p>
             <a:fld id="{4CAA9714-E498-4BB1-946F-9B4AA3A4C648}" type="datetimeFigureOut">
               <a:rPr lang="en-GB" smtClean="0"/>
-              <a:t>28/01/2021</a:t>
+              <a:t>29/01/2021</a:t>
             </a:fld>
             <a:endParaRPr lang="en-GB" dirty="0"/>
           </a:p>
@@ -1495,7 +1495,7 @@
           <a:p>
             <a:fld id="{4CAA9714-E498-4BB1-946F-9B4AA3A4C648}" type="datetimeFigureOut">
               <a:rPr lang="en-GB" smtClean="0"/>
-              <a:t>28/01/2021</a:t>
+              <a:t>29/01/2021</a:t>
             </a:fld>
             <a:endParaRPr lang="en-GB" dirty="0"/>
           </a:p>
@@ -1665,7 +1665,7 @@
           <a:p>
             <a:fld id="{4CAA9714-E498-4BB1-946F-9B4AA3A4C648}" type="datetimeFigureOut">
               <a:rPr lang="en-GB" smtClean="0"/>
-              <a:t>28/01/2021</a:t>
+              <a:t>29/01/2021</a:t>
             </a:fld>
             <a:endParaRPr lang="en-GB" dirty="0"/>
           </a:p>
@@ -1909,7 +1909,7 @@
           <a:p>
             <a:fld id="{4CAA9714-E498-4BB1-946F-9B4AA3A4C648}" type="datetimeFigureOut">
               <a:rPr lang="en-GB" smtClean="0"/>
-              <a:t>28/01/2021</a:t>
+              <a:t>29/01/2021</a:t>
             </a:fld>
             <a:endParaRPr lang="en-GB" dirty="0"/>
           </a:p>
@@ -2141,7 +2141,7 @@
           <a:p>
             <a:fld id="{4CAA9714-E498-4BB1-946F-9B4AA3A4C648}" type="datetimeFigureOut">
               <a:rPr lang="en-GB" smtClean="0"/>
-              <a:t>28/01/2021</a:t>
+              <a:t>29/01/2021</a:t>
             </a:fld>
             <a:endParaRPr lang="en-GB" dirty="0"/>
           </a:p>
@@ -2508,7 +2508,7 @@
           <a:p>
             <a:fld id="{4CAA9714-E498-4BB1-946F-9B4AA3A4C648}" type="datetimeFigureOut">
               <a:rPr lang="en-GB" smtClean="0"/>
-              <a:t>28/01/2021</a:t>
+              <a:t>29/01/2021</a:t>
             </a:fld>
             <a:endParaRPr lang="en-GB" dirty="0"/>
           </a:p>
@@ -2626,7 +2626,7 @@
           <a:p>
             <a:fld id="{4CAA9714-E498-4BB1-946F-9B4AA3A4C648}" type="datetimeFigureOut">
               <a:rPr lang="en-GB" smtClean="0"/>
-              <a:t>28/01/2021</a:t>
+              <a:t>29/01/2021</a:t>
             </a:fld>
             <a:endParaRPr lang="en-GB" dirty="0"/>
           </a:p>
@@ -2721,7 +2721,7 @@
           <a:p>
             <a:fld id="{4CAA9714-E498-4BB1-946F-9B4AA3A4C648}" type="datetimeFigureOut">
               <a:rPr lang="en-GB" smtClean="0"/>
-              <a:t>28/01/2021</a:t>
+              <a:t>29/01/2021</a:t>
             </a:fld>
             <a:endParaRPr lang="en-GB" dirty="0"/>
           </a:p>
@@ -2998,7 +2998,7 @@
           <a:p>
             <a:fld id="{4CAA9714-E498-4BB1-946F-9B4AA3A4C648}" type="datetimeFigureOut">
               <a:rPr lang="en-GB" smtClean="0"/>
-              <a:t>28/01/2021</a:t>
+              <a:t>29/01/2021</a:t>
             </a:fld>
             <a:endParaRPr lang="en-GB" dirty="0"/>
           </a:p>
@@ -3254,7 +3254,7 @@
           <a:p>
             <a:fld id="{4CAA9714-E498-4BB1-946F-9B4AA3A4C648}" type="datetimeFigureOut">
               <a:rPr lang="en-GB" smtClean="0"/>
-              <a:t>28/01/2021</a:t>
+              <a:t>29/01/2021</a:t>
             </a:fld>
             <a:endParaRPr lang="en-GB" dirty="0"/>
           </a:p>
@@ -3467,7 +3467,7 @@
           <a:p>
             <a:fld id="{4CAA9714-E498-4BB1-946F-9B4AA3A4C648}" type="datetimeFigureOut">
               <a:rPr lang="en-GB" smtClean="0"/>
-              <a:t>28/01/2021</a:t>
+              <a:t>29/01/2021</a:t>
             </a:fld>
             <a:endParaRPr lang="en-GB" dirty="0"/>
           </a:p>
@@ -9865,42 +9865,42 @@
           <a:p>
             <a:pPr lvl="1"/>
             <a:r>
-              <a:rPr lang="en-GB" dirty="0" err="1"/>
+              <a:rPr lang="en-GB" b="1" dirty="0" err="1"/>
               <a:t>GoToMarketingQuestionnaire</a:t>
             </a:r>
-            <a:endParaRPr lang="en-GB" dirty="0"/>
+            <a:endParaRPr lang="en-GB" b="1" dirty="0"/>
           </a:p>
           <a:p>
             <a:pPr lvl="1"/>
             <a:r>
-              <a:rPr lang="en-GB" dirty="0" err="1"/>
+              <a:rPr lang="en-GB" b="1" dirty="0" err="1"/>
               <a:t>GoToStatisticalQuestionnaire</a:t>
             </a:r>
-            <a:endParaRPr lang="en-GB" dirty="0"/>
+            <a:endParaRPr lang="en-GB" b="1" dirty="0"/>
           </a:p>
           <a:p>
             <a:pPr lvl="1"/>
             <a:r>
-              <a:rPr lang="en-GB" dirty="0" err="1"/>
+              <a:rPr lang="en-GB" u="sng" dirty="0" err="1"/>
               <a:t>CreateAnswer</a:t>
             </a:r>
-            <a:endParaRPr lang="en-GB" dirty="0"/>
+            <a:endParaRPr lang="en-GB" u="sng" dirty="0"/>
           </a:p>
           <a:p>
             <a:pPr lvl="1"/>
             <a:r>
-              <a:rPr lang="en-GB" dirty="0" err="1"/>
+              <a:rPr lang="en-GB" u="sng" dirty="0" err="1"/>
               <a:t>CancelAnswer</a:t>
             </a:r>
-            <a:endParaRPr lang="en-GB" dirty="0"/>
+            <a:endParaRPr lang="en-GB" u="sng" dirty="0"/>
           </a:p>
           <a:p>
             <a:pPr lvl="1"/>
             <a:r>
-              <a:rPr lang="en-GB" dirty="0" err="1"/>
+              <a:rPr lang="en-GB" u="sng" dirty="0" err="1"/>
               <a:t>GoToGreetingsPage</a:t>
             </a:r>
-            <a:endParaRPr lang="en-GB" dirty="0"/>
+            <a:endParaRPr lang="en-GB" u="sng" dirty="0"/>
           </a:p>
           <a:p>
             <a:pPr lvl="1"/>
@@ -10019,22 +10019,26 @@
           <a:p>
             <a:pPr lvl="1"/>
             <a:r>
+              <a:rPr lang="en-GB" b="1" dirty="0"/>
+              <a:t>Marketing.html</a:t>
+            </a:r>
+          </a:p>
+          <a:p>
+            <a:pPr lvl="1"/>
+            <a:r>
+              <a:rPr lang="en-GB" b="1" dirty="0"/>
+              <a:t>Statistical.html</a:t>
+            </a:r>
+          </a:p>
+          <a:p>
+            <a:pPr lvl="1"/>
+            <a:r>
+              <a:rPr lang="en-GB" u="sng" dirty="0"/>
+              <a:t>Greetings</a:t>
+            </a:r>
+            <a:r>
               <a:rPr lang="en-GB" dirty="0"/>
-              <a:t>Marketing.html</a:t>
-            </a:r>
-          </a:p>
-          <a:p>
-            <a:pPr lvl="1"/>
-            <a:r>
-              <a:rPr lang="en-GB" dirty="0"/>
-              <a:t>Statistical.html</a:t>
-            </a:r>
-          </a:p>
-          <a:p>
-            <a:pPr lvl="1"/>
-            <a:r>
-              <a:rPr lang="en-GB" dirty="0"/>
-              <a:t>Greetings.html</a:t>
+              <a:t>.html</a:t>
             </a:r>
           </a:p>
           <a:p>

</xml_diff>

<commit_message>
LoginFilter + OffensiveWord check
Login filter added on every servlet apart from Login/Logout/Register and OffensiveWord check implemented
</commit_message>
<xml_diff>
--- a/DD.pptx
+++ b/DD.pptx
@@ -15883,8 +15883,8 @@
         </p:nvSpPr>
         <p:spPr>
           <a:xfrm>
-            <a:off x="1041620" y="1690689"/>
-            <a:ext cx="7617349" cy="4296643"/>
+            <a:off x="205945" y="1674213"/>
+            <a:ext cx="4555524" cy="4907819"/>
           </a:xfrm>
         </p:spPr>
         <p:txBody>
@@ -16139,6 +16139,121 @@
               </a:rPr>
               <a:t>)</a:t>
             </a:r>
+          </a:p>
+        </p:txBody>
+      </p:sp>
+      <p:sp>
+        <p:nvSpPr>
+          <p:cNvPr id="2" name="CasellaDiTesto 1">
+            <a:extLst>
+              <a:ext uri="{FF2B5EF4-FFF2-40B4-BE49-F238E27FC236}">
+                <a16:creationId xmlns:a16="http://schemas.microsoft.com/office/drawing/2014/main" id="{338462ED-698C-44FE-AA52-1CCDB180270E}"/>
+              </a:ext>
+            </a:extLst>
+          </p:cNvPr>
+          <p:cNvSpPr txBox="1"/>
+          <p:nvPr/>
+        </p:nvSpPr>
+        <p:spPr>
+          <a:xfrm>
+            <a:off x="4588476" y="3016252"/>
+            <a:ext cx="4555524" cy="1369606"/>
+          </a:xfrm>
+          <a:prstGeom prst="rect">
+            <a:avLst/>
+          </a:prstGeom>
+          <a:noFill/>
+        </p:spPr>
+        <p:txBody>
+          <a:bodyPr wrap="square" rtlCol="0">
+            <a:spAutoFit/>
+          </a:bodyPr>
+          <a:lstStyle/>
+          <a:p>
+            <a:pPr>
+              <a:lnSpc>
+                <a:spcPct val="90000"/>
+              </a:lnSpc>
+              <a:spcBef>
+                <a:spcPts val="1000"/>
+              </a:spcBef>
+            </a:pPr>
+            <a:r>
+              <a:rPr lang="en-US" sz="1600" dirty="0">
+                <a:latin typeface="Courier New" panose="02070309020205020404" pitchFamily="49" charset="0"/>
+                <a:cs typeface="Courier New" panose="02070309020205020404" pitchFamily="49" charset="0"/>
+              </a:rPr>
+              <a:t>CREATE TABLE `</a:t>
+            </a:r>
+            <a:r>
+              <a:rPr lang="en-US" sz="1600" b="1" dirty="0" err="1">
+                <a:latin typeface="Courier New" panose="02070309020205020404" pitchFamily="49" charset="0"/>
+                <a:cs typeface="Courier New" panose="02070309020205020404" pitchFamily="49" charset="0"/>
+              </a:rPr>
+              <a:t>offensive_word</a:t>
+            </a:r>
+            <a:r>
+              <a:rPr lang="en-US" sz="1600" dirty="0">
+                <a:latin typeface="Courier New" panose="02070309020205020404" pitchFamily="49" charset="0"/>
+                <a:cs typeface="Courier New" panose="02070309020205020404" pitchFamily="49" charset="0"/>
+              </a:rPr>
+              <a:t>` (</a:t>
+            </a:r>
+          </a:p>
+          <a:p>
+            <a:pPr>
+              <a:lnSpc>
+                <a:spcPct val="90000"/>
+              </a:lnSpc>
+              <a:spcBef>
+                <a:spcPts val="1000"/>
+              </a:spcBef>
+            </a:pPr>
+            <a:r>
+              <a:rPr lang="en-US" sz="1600" dirty="0">
+                <a:latin typeface="Courier New" panose="02070309020205020404" pitchFamily="49" charset="0"/>
+                <a:cs typeface="Courier New" panose="02070309020205020404" pitchFamily="49" charset="0"/>
+              </a:rPr>
+              <a:t>  `id` int NOT NULL AUTO_INCREMENT,</a:t>
+            </a:r>
+          </a:p>
+          <a:p>
+            <a:pPr>
+              <a:lnSpc>
+                <a:spcPct val="90000"/>
+              </a:lnSpc>
+              <a:spcBef>
+                <a:spcPts val="1000"/>
+              </a:spcBef>
+            </a:pPr>
+            <a:r>
+              <a:rPr lang="en-US" sz="1600" dirty="0">
+                <a:latin typeface="Courier New" panose="02070309020205020404" pitchFamily="49" charset="0"/>
+                <a:cs typeface="Courier New" panose="02070309020205020404" pitchFamily="49" charset="0"/>
+              </a:rPr>
+              <a:t>  `word` varchar(50) NOT NULL, </a:t>
+            </a:r>
+          </a:p>
+          <a:p>
+            <a:pPr>
+              <a:lnSpc>
+                <a:spcPct val="90000"/>
+              </a:lnSpc>
+              <a:spcBef>
+                <a:spcPts val="1000"/>
+              </a:spcBef>
+            </a:pPr>
+            <a:r>
+              <a:rPr lang="en-US" sz="1600" dirty="0">
+                <a:latin typeface="Courier New" panose="02070309020205020404" pitchFamily="49" charset="0"/>
+                <a:cs typeface="Courier New" panose="02070309020205020404" pitchFamily="49" charset="0"/>
+              </a:rPr>
+              <a:t> PRIMARY KEY (`id`))</a:t>
+            </a:r>
+            <a:endParaRPr lang="it-IT" sz="1600" dirty="0">
+              <a:latin typeface="Courier New" panose="02070309020205020404" pitchFamily="49" charset="0"/>
+              <a:cs typeface="Courier New" panose="02070309020205020404" pitchFamily="49" charset="0"/>
+            </a:endParaRPr>
           </a:p>
         </p:txBody>
       </p:sp>

</xml_diff>

<commit_message>
Admin Checker filter + admin page creation
Admin Checker filter that works on admin related servlets + admin home page creation
</commit_message>
<xml_diff>
--- a/DD.pptx
+++ b/DD.pptx
@@ -226,7 +226,7 @@
           <a:p>
             <a:fld id="{ED92C02F-46E9-4319-AE92-CFF24FDD2824}" type="datetimeFigureOut">
               <a:rPr lang="en-GB" smtClean="0"/>
-              <a:t>29/01/2021</a:t>
+              <a:t>30/01/2021</a:t>
             </a:fld>
             <a:endParaRPr lang="en-GB" dirty="0"/>
           </a:p>
@@ -1145,7 +1145,7 @@
           <a:p>
             <a:fld id="{4CAA9714-E498-4BB1-946F-9B4AA3A4C648}" type="datetimeFigureOut">
               <a:rPr lang="en-GB" smtClean="0"/>
-              <a:t>29/01/2021</a:t>
+              <a:t>30/01/2021</a:t>
             </a:fld>
             <a:endParaRPr lang="en-GB" dirty="0"/>
           </a:p>
@@ -1315,7 +1315,7 @@
           <a:p>
             <a:fld id="{4CAA9714-E498-4BB1-946F-9B4AA3A4C648}" type="datetimeFigureOut">
               <a:rPr lang="en-GB" smtClean="0"/>
-              <a:t>29/01/2021</a:t>
+              <a:t>30/01/2021</a:t>
             </a:fld>
             <a:endParaRPr lang="en-GB" dirty="0"/>
           </a:p>
@@ -1495,7 +1495,7 @@
           <a:p>
             <a:fld id="{4CAA9714-E498-4BB1-946F-9B4AA3A4C648}" type="datetimeFigureOut">
               <a:rPr lang="en-GB" smtClean="0"/>
-              <a:t>29/01/2021</a:t>
+              <a:t>30/01/2021</a:t>
             </a:fld>
             <a:endParaRPr lang="en-GB" dirty="0"/>
           </a:p>
@@ -1665,7 +1665,7 @@
           <a:p>
             <a:fld id="{4CAA9714-E498-4BB1-946F-9B4AA3A4C648}" type="datetimeFigureOut">
               <a:rPr lang="en-GB" smtClean="0"/>
-              <a:t>29/01/2021</a:t>
+              <a:t>30/01/2021</a:t>
             </a:fld>
             <a:endParaRPr lang="en-GB" dirty="0"/>
           </a:p>
@@ -1909,7 +1909,7 @@
           <a:p>
             <a:fld id="{4CAA9714-E498-4BB1-946F-9B4AA3A4C648}" type="datetimeFigureOut">
               <a:rPr lang="en-GB" smtClean="0"/>
-              <a:t>29/01/2021</a:t>
+              <a:t>30/01/2021</a:t>
             </a:fld>
             <a:endParaRPr lang="en-GB" dirty="0"/>
           </a:p>
@@ -2141,7 +2141,7 @@
           <a:p>
             <a:fld id="{4CAA9714-E498-4BB1-946F-9B4AA3A4C648}" type="datetimeFigureOut">
               <a:rPr lang="en-GB" smtClean="0"/>
-              <a:t>29/01/2021</a:t>
+              <a:t>30/01/2021</a:t>
             </a:fld>
             <a:endParaRPr lang="en-GB" dirty="0"/>
           </a:p>
@@ -2508,7 +2508,7 @@
           <a:p>
             <a:fld id="{4CAA9714-E498-4BB1-946F-9B4AA3A4C648}" type="datetimeFigureOut">
               <a:rPr lang="en-GB" smtClean="0"/>
-              <a:t>29/01/2021</a:t>
+              <a:t>30/01/2021</a:t>
             </a:fld>
             <a:endParaRPr lang="en-GB" dirty="0"/>
           </a:p>
@@ -2626,7 +2626,7 @@
           <a:p>
             <a:fld id="{4CAA9714-E498-4BB1-946F-9B4AA3A4C648}" type="datetimeFigureOut">
               <a:rPr lang="en-GB" smtClean="0"/>
-              <a:t>29/01/2021</a:t>
+              <a:t>30/01/2021</a:t>
             </a:fld>
             <a:endParaRPr lang="en-GB" dirty="0"/>
           </a:p>
@@ -2721,7 +2721,7 @@
           <a:p>
             <a:fld id="{4CAA9714-E498-4BB1-946F-9B4AA3A4C648}" type="datetimeFigureOut">
               <a:rPr lang="en-GB" smtClean="0"/>
-              <a:t>29/01/2021</a:t>
+              <a:t>30/01/2021</a:t>
             </a:fld>
             <a:endParaRPr lang="en-GB" dirty="0"/>
           </a:p>
@@ -2998,7 +2998,7 @@
           <a:p>
             <a:fld id="{4CAA9714-E498-4BB1-946F-9B4AA3A4C648}" type="datetimeFigureOut">
               <a:rPr lang="en-GB" smtClean="0"/>
-              <a:t>29/01/2021</a:t>
+              <a:t>30/01/2021</a:t>
             </a:fld>
             <a:endParaRPr lang="en-GB" dirty="0"/>
           </a:p>
@@ -3254,7 +3254,7 @@
           <a:p>
             <a:fld id="{4CAA9714-E498-4BB1-946F-9B4AA3A4C648}" type="datetimeFigureOut">
               <a:rPr lang="en-GB" smtClean="0"/>
-              <a:t>29/01/2021</a:t>
+              <a:t>30/01/2021</a:t>
             </a:fld>
             <a:endParaRPr lang="en-GB" dirty="0"/>
           </a:p>
@@ -3467,7 +3467,7 @@
           <a:p>
             <a:fld id="{4CAA9714-E498-4BB1-946F-9B4AA3A4C648}" type="datetimeFigureOut">
               <a:rPr lang="en-GB" smtClean="0"/>
-              <a:t>29/01/2021</a:t>
+              <a:t>30/01/2021</a:t>
             </a:fld>
             <a:endParaRPr lang="en-GB" dirty="0"/>
           </a:p>
@@ -9865,42 +9865,42 @@
           <a:p>
             <a:pPr lvl="1"/>
             <a:r>
-              <a:rPr lang="en-GB" b="1" dirty="0" err="1"/>
+              <a:rPr lang="en-GB" dirty="0" err="1"/>
               <a:t>GoToMarketingQuestionnaire</a:t>
             </a:r>
-            <a:endParaRPr lang="en-GB" b="1" dirty="0"/>
+            <a:endParaRPr lang="en-GB" dirty="0"/>
           </a:p>
           <a:p>
             <a:pPr lvl="1"/>
             <a:r>
-              <a:rPr lang="en-GB" b="1" dirty="0" err="1"/>
+              <a:rPr lang="en-GB" dirty="0" err="1"/>
               <a:t>GoToStatisticalQuestionnaire</a:t>
             </a:r>
-            <a:endParaRPr lang="en-GB" b="1" dirty="0"/>
+            <a:endParaRPr lang="en-GB" dirty="0"/>
           </a:p>
           <a:p>
             <a:pPr lvl="1"/>
             <a:r>
-              <a:rPr lang="en-GB" u="sng" dirty="0" err="1"/>
+              <a:rPr lang="en-GB" dirty="0" err="1"/>
               <a:t>CreateAnswer</a:t>
             </a:r>
-            <a:endParaRPr lang="en-GB" u="sng" dirty="0"/>
+            <a:endParaRPr lang="en-GB" dirty="0"/>
           </a:p>
           <a:p>
             <a:pPr lvl="1"/>
             <a:r>
-              <a:rPr lang="en-GB" u="sng" dirty="0" err="1"/>
+              <a:rPr lang="en-GB" dirty="0" err="1"/>
               <a:t>CancelAnswer</a:t>
             </a:r>
-            <a:endParaRPr lang="en-GB" u="sng" dirty="0"/>
+            <a:endParaRPr lang="en-GB" dirty="0"/>
           </a:p>
           <a:p>
             <a:pPr lvl="1"/>
             <a:r>
-              <a:rPr lang="en-GB" u="sng" dirty="0" err="1"/>
+              <a:rPr lang="en-GB" dirty="0" err="1"/>
               <a:t>GoToGreetingsPage</a:t>
             </a:r>
-            <a:endParaRPr lang="en-GB" u="sng" dirty="0"/>
+            <a:endParaRPr lang="en-GB" dirty="0"/>
           </a:p>
           <a:p>
             <a:pPr lvl="1"/>
@@ -9914,7 +9914,7 @@
             <a:pPr lvl="1"/>
             <a:r>
               <a:rPr lang="en-GB" dirty="0" err="1"/>
-              <a:t>GoToAdminHome</a:t>
+              <a:t>GoToAdmin</a:t>
             </a:r>
             <a:endParaRPr lang="en-GB" dirty="0"/>
           </a:p>
@@ -10019,26 +10019,38 @@
           <a:p>
             <a:pPr lvl="1"/>
             <a:r>
+              <a:rPr lang="en-GB" dirty="0"/>
+              <a:t>Marketing</a:t>
+            </a:r>
+            <a:r>
               <a:rPr lang="en-GB" b="1" dirty="0"/>
-              <a:t>Marketing.html</a:t>
+              <a:t>.</a:t>
+            </a:r>
+            <a:r>
+              <a:rPr lang="en-GB" dirty="0"/>
+              <a:t>html</a:t>
             </a:r>
           </a:p>
           <a:p>
             <a:pPr lvl="1"/>
             <a:r>
+              <a:rPr lang="en-GB" dirty="0"/>
+              <a:t>Statistical</a:t>
+            </a:r>
+            <a:r>
               <a:rPr lang="en-GB" b="1" dirty="0"/>
-              <a:t>Statistical.html</a:t>
+              <a:t>.</a:t>
+            </a:r>
+            <a:r>
+              <a:rPr lang="en-GB" dirty="0"/>
+              <a:t>html</a:t>
             </a:r>
           </a:p>
           <a:p>
             <a:pPr lvl="1"/>
             <a:r>
-              <a:rPr lang="en-GB" u="sng" dirty="0"/>
-              <a:t>Greetings</a:t>
-            </a:r>
-            <a:r>
               <a:rPr lang="en-GB" dirty="0"/>
-              <a:t>.html</a:t>
+              <a:t>Greetings.html</a:t>
             </a:r>
           </a:p>
           <a:p>

</xml_diff>